<commit_message>
Anpassung der Quellen. 2 Links gelöscht. Wir verweisen ja auch auf das pdf.
</commit_message>
<xml_diff>
--- a/Documentation/Master Vortrag ML_group5_v05_prefinal.pptx
+++ b/Documentation/Master Vortrag ML_group5_v05_prefinal.pptx
@@ -4210,7 +4210,7 @@
           </a:ln>
           <a:extLst>
             <a:ext uri="{C572A759-6A51-4108-AA02-DFA0A04FC94B}">
-              <ma14:wrappingTextBoxFlag xmlns="" xmlns:m="http://schemas.openxmlformats.org/officeDocument/2006/math" xmlns:a14="http://schemas.microsoft.com/office/drawing/2010/main" xmlns:ma14="http://schemas.microsoft.com/office/mac/drawingml/2011/main" val="1"/>
+              <ma14:wrappingTextBoxFlag xmlns:ma14="http://schemas.microsoft.com/office/mac/drawingml/2011/main" xmlns:a14="http://schemas.microsoft.com/office/drawing/2010/main" xmlns:m="http://schemas.openxmlformats.org/officeDocument/2006/math" xmlns="" val="1"/>
             </a:ext>
           </a:extLst>
         </p:spPr>
@@ -4285,7 +4285,7 @@
           </a:ln>
           <a:extLst>
             <a:ext uri="{C572A759-6A51-4108-AA02-DFA0A04FC94B}">
-              <ma14:wrappingTextBoxFlag xmlns="" xmlns:m="http://schemas.openxmlformats.org/officeDocument/2006/math" xmlns:a14="http://schemas.microsoft.com/office/drawing/2010/main" xmlns:ma14="http://schemas.microsoft.com/office/mac/drawingml/2011/main" val="1"/>
+              <ma14:wrappingTextBoxFlag xmlns:ma14="http://schemas.microsoft.com/office/mac/drawingml/2011/main" xmlns:a14="http://schemas.microsoft.com/office/drawing/2010/main" xmlns:m="http://schemas.openxmlformats.org/officeDocument/2006/math" xmlns="" val="1"/>
             </a:ext>
           </a:extLst>
         </p:spPr>
@@ -4396,7 +4396,7 @@
           </a:ln>
           <a:extLst>
             <a:ext uri="{C572A759-6A51-4108-AA02-DFA0A04FC94B}">
-              <ma14:wrappingTextBoxFlag xmlns="" xmlns:m="http://schemas.openxmlformats.org/officeDocument/2006/math" xmlns:a14="http://schemas.microsoft.com/office/drawing/2010/main" xmlns:ma14="http://schemas.microsoft.com/office/mac/drawingml/2011/main" val="1"/>
+              <ma14:wrappingTextBoxFlag xmlns:ma14="http://schemas.microsoft.com/office/mac/drawingml/2011/main" xmlns:a14="http://schemas.microsoft.com/office/drawing/2010/main" xmlns:m="http://schemas.openxmlformats.org/officeDocument/2006/math" xmlns="" val="1"/>
             </a:ext>
           </a:extLst>
         </p:spPr>
@@ -4492,7 +4492,7 @@
           </a:ln>
           <a:extLst>
             <a:ext uri="{C572A759-6A51-4108-AA02-DFA0A04FC94B}">
-              <ma14:wrappingTextBoxFlag xmlns="" xmlns:m="http://schemas.openxmlformats.org/officeDocument/2006/math" xmlns:a14="http://schemas.microsoft.com/office/drawing/2010/main" xmlns:ma14="http://schemas.microsoft.com/office/mac/drawingml/2011/main" val="1"/>
+              <ma14:wrappingTextBoxFlag xmlns:ma14="http://schemas.microsoft.com/office/mac/drawingml/2011/main" xmlns:a14="http://schemas.microsoft.com/office/drawing/2010/main" xmlns:m="http://schemas.openxmlformats.org/officeDocument/2006/math" xmlns="" val="1"/>
             </a:ext>
           </a:extLst>
         </p:spPr>
@@ -4567,7 +4567,7 @@
           </a:ln>
           <a:extLst>
             <a:ext uri="{C572A759-6A51-4108-AA02-DFA0A04FC94B}">
-              <ma14:wrappingTextBoxFlag xmlns="" xmlns:m="http://schemas.openxmlformats.org/officeDocument/2006/math" xmlns:a14="http://schemas.microsoft.com/office/drawing/2010/main" xmlns:ma14="http://schemas.microsoft.com/office/mac/drawingml/2011/main" val="1"/>
+              <ma14:wrappingTextBoxFlag xmlns:ma14="http://schemas.microsoft.com/office/mac/drawingml/2011/main" xmlns:a14="http://schemas.microsoft.com/office/drawing/2010/main" xmlns:m="http://schemas.openxmlformats.org/officeDocument/2006/math" xmlns="" val="1"/>
             </a:ext>
           </a:extLst>
         </p:spPr>
@@ -4606,7 +4606,7 @@
           </a:ln>
           <a:extLst>
             <a:ext uri="{C572A759-6A51-4108-AA02-DFA0A04FC94B}">
-              <ma14:wrappingTextBoxFlag xmlns="" xmlns:m="http://schemas.openxmlformats.org/officeDocument/2006/math" xmlns:a14="http://schemas.microsoft.com/office/drawing/2010/main" xmlns:ma14="http://schemas.microsoft.com/office/mac/drawingml/2011/main" val="1"/>
+              <ma14:wrappingTextBoxFlag xmlns:ma14="http://schemas.microsoft.com/office/mac/drawingml/2011/main" xmlns:a14="http://schemas.microsoft.com/office/drawing/2010/main" xmlns:m="http://schemas.openxmlformats.org/officeDocument/2006/math" xmlns="" val="1"/>
             </a:ext>
           </a:extLst>
         </p:spPr>
@@ -4681,7 +4681,7 @@
           </a:ln>
           <a:extLst>
             <a:ext uri="{C572A759-6A51-4108-AA02-DFA0A04FC94B}">
-              <ma14:wrappingTextBoxFlag xmlns="" xmlns:m="http://schemas.openxmlformats.org/officeDocument/2006/math" xmlns:a14="http://schemas.microsoft.com/office/drawing/2010/main" xmlns:ma14="http://schemas.microsoft.com/office/mac/drawingml/2011/main" val="1"/>
+              <ma14:wrappingTextBoxFlag xmlns:ma14="http://schemas.microsoft.com/office/mac/drawingml/2011/main" xmlns:a14="http://schemas.microsoft.com/office/drawing/2010/main" xmlns:m="http://schemas.openxmlformats.org/officeDocument/2006/math" xmlns="" val="1"/>
             </a:ext>
           </a:extLst>
         </p:spPr>
@@ -8930,7 +8930,7 @@
           </a:ln>
           <a:extLst>
             <a:ext uri="{C572A759-6A51-4108-AA02-DFA0A04FC94B}">
-              <ma14:wrappingTextBoxFlag xmlns="" xmlns:m="http://schemas.openxmlformats.org/officeDocument/2006/math" xmlns:a14="http://schemas.microsoft.com/office/drawing/2010/main" xmlns:ma14="http://schemas.microsoft.com/office/mac/drawingml/2011/main" val="1"/>
+              <ma14:wrappingTextBoxFlag xmlns:ma14="http://schemas.microsoft.com/office/mac/drawingml/2011/main" xmlns:a14="http://schemas.microsoft.com/office/drawing/2010/main" xmlns:m="http://schemas.openxmlformats.org/officeDocument/2006/math" xmlns="" val="1"/>
             </a:ext>
           </a:extLst>
         </p:spPr>
@@ -8972,7 +8972,7 @@
           </a:ln>
           <a:extLst>
             <a:ext uri="{C572A759-6A51-4108-AA02-DFA0A04FC94B}">
-              <ma14:wrappingTextBoxFlag xmlns="" xmlns:m="http://schemas.openxmlformats.org/officeDocument/2006/math" xmlns:a14="http://schemas.microsoft.com/office/drawing/2010/main" xmlns:ma14="http://schemas.microsoft.com/office/mac/drawingml/2011/main" val="1"/>
+              <ma14:wrappingTextBoxFlag xmlns:ma14="http://schemas.microsoft.com/office/mac/drawingml/2011/main" xmlns:a14="http://schemas.microsoft.com/office/drawing/2010/main" xmlns:m="http://schemas.openxmlformats.org/officeDocument/2006/math" xmlns="" val="1"/>
             </a:ext>
           </a:extLst>
         </p:spPr>
@@ -10968,7 +10968,7 @@
           </a:ln>
           <a:extLst>
             <a:ext uri="{C572A759-6A51-4108-AA02-DFA0A04FC94B}">
-              <ma14:wrappingTextBoxFlag xmlns:ma14="http://schemas.microsoft.com/office/mac/drawingml/2011/main" xmlns:a14="http://schemas.microsoft.com/office/drawing/2010/main" xmlns:m="http://schemas.openxmlformats.org/officeDocument/2006/math" xmlns="" val="1"/>
+              <ma14:wrappingTextBoxFlag xmlns="" xmlns:m="http://schemas.openxmlformats.org/officeDocument/2006/math" xmlns:a14="http://schemas.microsoft.com/office/drawing/2010/main" xmlns:ma14="http://schemas.microsoft.com/office/mac/drawingml/2011/main" val="1"/>
             </a:ext>
           </a:extLst>
         </p:spPr>
@@ -11010,7 +11010,7 @@
           </a:ln>
           <a:extLst>
             <a:ext uri="{C572A759-6A51-4108-AA02-DFA0A04FC94B}">
-              <ma14:wrappingTextBoxFlag xmlns:ma14="http://schemas.microsoft.com/office/mac/drawingml/2011/main" xmlns:a14="http://schemas.microsoft.com/office/drawing/2010/main" xmlns:m="http://schemas.openxmlformats.org/officeDocument/2006/math" xmlns="" val="1"/>
+              <ma14:wrappingTextBoxFlag xmlns="" xmlns:m="http://schemas.openxmlformats.org/officeDocument/2006/math" xmlns:a14="http://schemas.microsoft.com/office/drawing/2010/main" xmlns:ma14="http://schemas.microsoft.com/office/mac/drawingml/2011/main" val="1"/>
             </a:ext>
           </a:extLst>
         </p:spPr>
@@ -11076,7 +11076,7 @@
           </a:ln>
           <a:extLst>
             <a:ext uri="{C572A759-6A51-4108-AA02-DFA0A04FC94B}">
-              <ma14:wrappingTextBoxFlag xmlns="" xmlns:m="http://schemas.openxmlformats.org/officeDocument/2006/math" xmlns:a14="http://schemas.microsoft.com/office/drawing/2010/main" xmlns:ma14="http://schemas.microsoft.com/office/mac/drawingml/2011/main" val="1"/>
+              <ma14:wrappingTextBoxFlag xmlns:ma14="http://schemas.microsoft.com/office/mac/drawingml/2011/main" xmlns:a14="http://schemas.microsoft.com/office/drawing/2010/main" xmlns:m="http://schemas.openxmlformats.org/officeDocument/2006/math" xmlns="" val="1"/>
             </a:ext>
           </a:extLst>
         </p:spPr>
@@ -11151,7 +11151,7 @@
           </a:ln>
           <a:extLst>
             <a:ext uri="{C572A759-6A51-4108-AA02-DFA0A04FC94B}">
-              <ma14:wrappingTextBoxFlag xmlns="" xmlns:m="http://schemas.openxmlformats.org/officeDocument/2006/math" xmlns:a14="http://schemas.microsoft.com/office/drawing/2010/main" xmlns:ma14="http://schemas.microsoft.com/office/mac/drawingml/2011/main" val="1"/>
+              <ma14:wrappingTextBoxFlag xmlns:ma14="http://schemas.microsoft.com/office/mac/drawingml/2011/main" xmlns:a14="http://schemas.microsoft.com/office/drawing/2010/main" xmlns:m="http://schemas.openxmlformats.org/officeDocument/2006/math" xmlns="" val="1"/>
             </a:ext>
           </a:extLst>
         </p:spPr>
@@ -11200,7 +11200,7 @@
           </a:prstGeom>
           <a:extLst>
             <a:ext uri="{C572A759-6A51-4108-AA02-DFA0A04FC94B}">
-              <ma14:wrappingTextBoxFlag xmlns="" xmlns:m="http://schemas.openxmlformats.org/officeDocument/2006/math" xmlns:a14="http://schemas.microsoft.com/office/drawing/2010/main" xmlns:ma14="http://schemas.microsoft.com/office/mac/drawingml/2011/main" val="1"/>
+              <ma14:wrappingTextBoxFlag xmlns:ma14="http://schemas.microsoft.com/office/mac/drawingml/2011/main" xmlns:a14="http://schemas.microsoft.com/office/drawing/2010/main" xmlns:m="http://schemas.openxmlformats.org/officeDocument/2006/math" xmlns="" val="1"/>
             </a:ext>
           </a:extLst>
         </p:spPr>
@@ -11282,7 +11282,7 @@
           </a:effectLst>
           <a:extLst>
             <a:ext uri="{C572A759-6A51-4108-AA02-DFA0A04FC94B}">
-              <ma14:wrappingTextBoxFlag xmlns="" xmlns:m="http://schemas.openxmlformats.org/officeDocument/2006/math" xmlns:a14="http://schemas.microsoft.com/office/drawing/2010/main" xmlns:ma14="http://schemas.microsoft.com/office/mac/drawingml/2011/main" val="1"/>
+              <ma14:wrappingTextBoxFlag xmlns:ma14="http://schemas.microsoft.com/office/mac/drawingml/2011/main" xmlns:a14="http://schemas.microsoft.com/office/drawing/2010/main" xmlns:m="http://schemas.openxmlformats.org/officeDocument/2006/math" xmlns="" val="1"/>
             </a:ext>
           </a:extLst>
         </p:spPr>
@@ -11324,7 +11324,7 @@
           </a:ln>
           <a:extLst>
             <a:ext uri="{C572A759-6A51-4108-AA02-DFA0A04FC94B}">
-              <ma14:wrappingTextBoxFlag xmlns="" xmlns:m="http://schemas.openxmlformats.org/officeDocument/2006/math" xmlns:a14="http://schemas.microsoft.com/office/drawing/2010/main" xmlns:ma14="http://schemas.microsoft.com/office/mac/drawingml/2011/main" val="1"/>
+              <ma14:wrappingTextBoxFlag xmlns:ma14="http://schemas.microsoft.com/office/mac/drawingml/2011/main" xmlns:a14="http://schemas.microsoft.com/office/drawing/2010/main" xmlns:m="http://schemas.openxmlformats.org/officeDocument/2006/math" xmlns="" val="1"/>
             </a:ext>
           </a:extLst>
         </p:spPr>
@@ -11363,7 +11363,7 @@
           </a:ln>
           <a:extLst>
             <a:ext uri="{C572A759-6A51-4108-AA02-DFA0A04FC94B}">
-              <ma14:wrappingTextBoxFlag xmlns="" xmlns:m="http://schemas.openxmlformats.org/officeDocument/2006/math" xmlns:a14="http://schemas.microsoft.com/office/drawing/2010/main" xmlns:ma14="http://schemas.microsoft.com/office/mac/drawingml/2011/main" val="1"/>
+              <ma14:wrappingTextBoxFlag xmlns:ma14="http://schemas.microsoft.com/office/mac/drawingml/2011/main" xmlns:a14="http://schemas.microsoft.com/office/drawing/2010/main" xmlns:m="http://schemas.openxmlformats.org/officeDocument/2006/math" xmlns="" val="1"/>
             </a:ext>
           </a:extLst>
         </p:spPr>
@@ -11402,7 +11402,7 @@
           </a:ln>
           <a:extLst>
             <a:ext uri="{C572A759-6A51-4108-AA02-DFA0A04FC94B}">
-              <ma14:wrappingTextBoxFlag xmlns="" xmlns:m="http://schemas.openxmlformats.org/officeDocument/2006/math" xmlns:a14="http://schemas.microsoft.com/office/drawing/2010/main" xmlns:ma14="http://schemas.microsoft.com/office/mac/drawingml/2011/main" val="1"/>
+              <ma14:wrappingTextBoxFlag xmlns:ma14="http://schemas.microsoft.com/office/mac/drawingml/2011/main" xmlns:a14="http://schemas.microsoft.com/office/drawing/2010/main" xmlns:m="http://schemas.openxmlformats.org/officeDocument/2006/math" xmlns="" val="1"/>
             </a:ext>
           </a:extLst>
         </p:spPr>
@@ -11441,7 +11441,7 @@
           </a:ln>
           <a:extLst>
             <a:ext uri="{C572A759-6A51-4108-AA02-DFA0A04FC94B}">
-              <ma14:wrappingTextBoxFlag xmlns="" xmlns:m="http://schemas.openxmlformats.org/officeDocument/2006/math" xmlns:a14="http://schemas.microsoft.com/office/drawing/2010/main" xmlns:ma14="http://schemas.microsoft.com/office/mac/drawingml/2011/main" val="1"/>
+              <ma14:wrappingTextBoxFlag xmlns:ma14="http://schemas.microsoft.com/office/mac/drawingml/2011/main" xmlns:a14="http://schemas.microsoft.com/office/drawing/2010/main" xmlns:m="http://schemas.openxmlformats.org/officeDocument/2006/math" xmlns="" val="1"/>
             </a:ext>
           </a:extLst>
         </p:spPr>
@@ -11480,7 +11480,7 @@
           </a:ln>
           <a:extLst>
             <a:ext uri="{C572A759-6A51-4108-AA02-DFA0A04FC94B}">
-              <ma14:wrappingTextBoxFlag xmlns="" xmlns:m="http://schemas.openxmlformats.org/officeDocument/2006/math" xmlns:a14="http://schemas.microsoft.com/office/drawing/2010/main" xmlns:ma14="http://schemas.microsoft.com/office/mac/drawingml/2011/main" val="1"/>
+              <ma14:wrappingTextBoxFlag xmlns:ma14="http://schemas.microsoft.com/office/mac/drawingml/2011/main" xmlns:a14="http://schemas.microsoft.com/office/drawing/2010/main" xmlns:m="http://schemas.openxmlformats.org/officeDocument/2006/math" xmlns="" val="1"/>
             </a:ext>
           </a:extLst>
         </p:spPr>
@@ -11531,7 +11531,7 @@
           </a:effectLst>
           <a:extLst>
             <a:ext uri="{C572A759-6A51-4108-AA02-DFA0A04FC94B}">
-              <ma14:wrappingTextBoxFlag xmlns="" xmlns:m="http://schemas.openxmlformats.org/officeDocument/2006/math" xmlns:a14="http://schemas.microsoft.com/office/drawing/2010/main" xmlns:ma14="http://schemas.microsoft.com/office/mac/drawingml/2011/main" val="1"/>
+              <ma14:wrappingTextBoxFlag xmlns:ma14="http://schemas.microsoft.com/office/mac/drawingml/2011/main" xmlns:a14="http://schemas.microsoft.com/office/drawing/2010/main" xmlns:m="http://schemas.openxmlformats.org/officeDocument/2006/math" xmlns="" val="1"/>
             </a:ext>
           </a:extLst>
         </p:spPr>
@@ -11573,7 +11573,7 @@
           </a:ln>
           <a:extLst>
             <a:ext uri="{C572A759-6A51-4108-AA02-DFA0A04FC94B}">
-              <ma14:wrappingTextBoxFlag xmlns="" xmlns:m="http://schemas.openxmlformats.org/officeDocument/2006/math" xmlns:a14="http://schemas.microsoft.com/office/drawing/2010/main" xmlns:ma14="http://schemas.microsoft.com/office/mac/drawingml/2011/main" val="1"/>
+              <ma14:wrappingTextBoxFlag xmlns:ma14="http://schemas.microsoft.com/office/mac/drawingml/2011/main" xmlns:a14="http://schemas.microsoft.com/office/drawing/2010/main" xmlns:m="http://schemas.openxmlformats.org/officeDocument/2006/math" xmlns="" val="1"/>
             </a:ext>
           </a:extLst>
         </p:spPr>
@@ -11612,7 +11612,7 @@
           </a:ln>
           <a:extLst>
             <a:ext uri="{C572A759-6A51-4108-AA02-DFA0A04FC94B}">
-              <ma14:wrappingTextBoxFlag xmlns="" xmlns:m="http://schemas.openxmlformats.org/officeDocument/2006/math" xmlns:a14="http://schemas.microsoft.com/office/drawing/2010/main" xmlns:ma14="http://schemas.microsoft.com/office/mac/drawingml/2011/main" val="1"/>
+              <ma14:wrappingTextBoxFlag xmlns:ma14="http://schemas.microsoft.com/office/mac/drawingml/2011/main" xmlns:a14="http://schemas.microsoft.com/office/drawing/2010/main" xmlns:m="http://schemas.openxmlformats.org/officeDocument/2006/math" xmlns="" val="1"/>
             </a:ext>
           </a:extLst>
         </p:spPr>
@@ -11651,7 +11651,7 @@
           </a:ln>
           <a:extLst>
             <a:ext uri="{C572A759-6A51-4108-AA02-DFA0A04FC94B}">
-              <ma14:wrappingTextBoxFlag xmlns="" xmlns:m="http://schemas.openxmlformats.org/officeDocument/2006/math" xmlns:a14="http://schemas.microsoft.com/office/drawing/2010/main" xmlns:ma14="http://schemas.microsoft.com/office/mac/drawingml/2011/main" val="1"/>
+              <ma14:wrappingTextBoxFlag xmlns:ma14="http://schemas.microsoft.com/office/mac/drawingml/2011/main" xmlns:a14="http://schemas.microsoft.com/office/drawing/2010/main" xmlns:m="http://schemas.openxmlformats.org/officeDocument/2006/math" xmlns="" val="1"/>
             </a:ext>
           </a:extLst>
         </p:spPr>
@@ -11690,7 +11690,7 @@
           </a:ln>
           <a:extLst>
             <a:ext uri="{C572A759-6A51-4108-AA02-DFA0A04FC94B}">
-              <ma14:wrappingTextBoxFlag xmlns="" xmlns:m="http://schemas.openxmlformats.org/officeDocument/2006/math" xmlns:a14="http://schemas.microsoft.com/office/drawing/2010/main" xmlns:ma14="http://schemas.microsoft.com/office/mac/drawingml/2011/main" val="1"/>
+              <ma14:wrappingTextBoxFlag xmlns:ma14="http://schemas.microsoft.com/office/mac/drawingml/2011/main" xmlns:a14="http://schemas.microsoft.com/office/drawing/2010/main" xmlns:m="http://schemas.openxmlformats.org/officeDocument/2006/math" xmlns="" val="1"/>
             </a:ext>
           </a:extLst>
         </p:spPr>
@@ -11741,7 +11741,7 @@
           </a:effectLst>
           <a:extLst>
             <a:ext uri="{C572A759-6A51-4108-AA02-DFA0A04FC94B}">
-              <ma14:wrappingTextBoxFlag xmlns="" xmlns:m="http://schemas.openxmlformats.org/officeDocument/2006/math" xmlns:a14="http://schemas.microsoft.com/office/drawing/2010/main" xmlns:ma14="http://schemas.microsoft.com/office/mac/drawingml/2011/main" val="1"/>
+              <ma14:wrappingTextBoxFlag xmlns:ma14="http://schemas.microsoft.com/office/mac/drawingml/2011/main" xmlns:a14="http://schemas.microsoft.com/office/drawing/2010/main" xmlns:m="http://schemas.openxmlformats.org/officeDocument/2006/math" xmlns="" val="1"/>
             </a:ext>
           </a:extLst>
         </p:spPr>
@@ -11783,7 +11783,7 @@
           </a:ln>
           <a:extLst>
             <a:ext uri="{C572A759-6A51-4108-AA02-DFA0A04FC94B}">
-              <ma14:wrappingTextBoxFlag xmlns="" xmlns:m="http://schemas.openxmlformats.org/officeDocument/2006/math" xmlns:a14="http://schemas.microsoft.com/office/drawing/2010/main" xmlns:ma14="http://schemas.microsoft.com/office/mac/drawingml/2011/main" val="1"/>
+              <ma14:wrappingTextBoxFlag xmlns:ma14="http://schemas.microsoft.com/office/mac/drawingml/2011/main" xmlns:a14="http://schemas.microsoft.com/office/drawing/2010/main" xmlns:m="http://schemas.openxmlformats.org/officeDocument/2006/math" xmlns="" val="1"/>
             </a:ext>
           </a:extLst>
         </p:spPr>
@@ -11822,7 +11822,7 @@
           </a:ln>
           <a:extLst>
             <a:ext uri="{C572A759-6A51-4108-AA02-DFA0A04FC94B}">
-              <ma14:wrappingTextBoxFlag xmlns="" xmlns:m="http://schemas.openxmlformats.org/officeDocument/2006/math" xmlns:a14="http://schemas.microsoft.com/office/drawing/2010/main" xmlns:ma14="http://schemas.microsoft.com/office/mac/drawingml/2011/main" val="1"/>
+              <ma14:wrappingTextBoxFlag xmlns:ma14="http://schemas.microsoft.com/office/mac/drawingml/2011/main" xmlns:a14="http://schemas.microsoft.com/office/drawing/2010/main" xmlns:m="http://schemas.openxmlformats.org/officeDocument/2006/math" xmlns="" val="1"/>
             </a:ext>
           </a:extLst>
         </p:spPr>
@@ -11861,7 +11861,7 @@
           </a:ln>
           <a:extLst>
             <a:ext uri="{C572A759-6A51-4108-AA02-DFA0A04FC94B}">
-              <ma14:wrappingTextBoxFlag xmlns="" xmlns:m="http://schemas.openxmlformats.org/officeDocument/2006/math" xmlns:a14="http://schemas.microsoft.com/office/drawing/2010/main" xmlns:ma14="http://schemas.microsoft.com/office/mac/drawingml/2011/main" val="1"/>
+              <ma14:wrappingTextBoxFlag xmlns:ma14="http://schemas.microsoft.com/office/mac/drawingml/2011/main" xmlns:a14="http://schemas.microsoft.com/office/drawing/2010/main" xmlns:m="http://schemas.openxmlformats.org/officeDocument/2006/math" xmlns="" val="1"/>
             </a:ext>
           </a:extLst>
         </p:spPr>
@@ -12265,7 +12265,7 @@
           </a:ln>
           <a:extLst>
             <a:ext uri="{C572A759-6A51-4108-AA02-DFA0A04FC94B}">
-              <ma14:wrappingTextBoxFlag xmlns="" xmlns:m="http://schemas.openxmlformats.org/officeDocument/2006/math" xmlns:a14="http://schemas.microsoft.com/office/drawing/2010/main" xmlns:ma14="http://schemas.microsoft.com/office/mac/drawingml/2011/main" val="1"/>
+              <ma14:wrappingTextBoxFlag xmlns:ma14="http://schemas.microsoft.com/office/mac/drawingml/2011/main" xmlns:a14="http://schemas.microsoft.com/office/drawing/2010/main" xmlns:m="http://schemas.openxmlformats.org/officeDocument/2006/math" xmlns="" val="1"/>
             </a:ext>
           </a:extLst>
         </p:spPr>
@@ -12340,7 +12340,7 @@
           </a:ln>
           <a:extLst>
             <a:ext uri="{C572A759-6A51-4108-AA02-DFA0A04FC94B}">
-              <ma14:wrappingTextBoxFlag xmlns="" xmlns:m="http://schemas.openxmlformats.org/officeDocument/2006/math" xmlns:a14="http://schemas.microsoft.com/office/drawing/2010/main" xmlns:ma14="http://schemas.microsoft.com/office/mac/drawingml/2011/main" val="1"/>
+              <ma14:wrappingTextBoxFlag xmlns:ma14="http://schemas.microsoft.com/office/mac/drawingml/2011/main" xmlns:a14="http://schemas.microsoft.com/office/drawing/2010/main" xmlns:m="http://schemas.openxmlformats.org/officeDocument/2006/math" xmlns="" val="1"/>
             </a:ext>
           </a:extLst>
         </p:spPr>
@@ -12389,7 +12389,7 @@
           </a:prstGeom>
           <a:extLst>
             <a:ext uri="{C572A759-6A51-4108-AA02-DFA0A04FC94B}">
-              <ma14:wrappingTextBoxFlag xmlns="" xmlns:m="http://schemas.openxmlformats.org/officeDocument/2006/math" xmlns:a14="http://schemas.microsoft.com/office/drawing/2010/main" xmlns:ma14="http://schemas.microsoft.com/office/mac/drawingml/2011/main" val="1"/>
+              <ma14:wrappingTextBoxFlag xmlns:ma14="http://schemas.microsoft.com/office/mac/drawingml/2011/main" xmlns:a14="http://schemas.microsoft.com/office/drawing/2010/main" xmlns:m="http://schemas.openxmlformats.org/officeDocument/2006/math" xmlns="" val="1"/>
             </a:ext>
           </a:extLst>
         </p:spPr>
@@ -12498,7 +12498,7 @@
           </a:effectLst>
           <a:extLst>
             <a:ext uri="{C572A759-6A51-4108-AA02-DFA0A04FC94B}">
-              <ma14:wrappingTextBoxFlag xmlns="" xmlns:m="http://schemas.openxmlformats.org/officeDocument/2006/math" xmlns:a14="http://schemas.microsoft.com/office/drawing/2010/main" xmlns:ma14="http://schemas.microsoft.com/office/mac/drawingml/2011/main" val="1"/>
+              <ma14:wrappingTextBoxFlag xmlns:ma14="http://schemas.microsoft.com/office/mac/drawingml/2011/main" xmlns:a14="http://schemas.microsoft.com/office/drawing/2010/main" xmlns:m="http://schemas.openxmlformats.org/officeDocument/2006/math" xmlns="" val="1"/>
             </a:ext>
           </a:extLst>
         </p:spPr>
@@ -12550,7 +12550,7 @@
           </a:effectLst>
           <a:extLst>
             <a:ext uri="{C572A759-6A51-4108-AA02-DFA0A04FC94B}">
-              <ma14:wrappingTextBoxFlag xmlns="" xmlns:m="http://schemas.openxmlformats.org/officeDocument/2006/math" xmlns:a14="http://schemas.microsoft.com/office/drawing/2010/main" xmlns:ma14="http://schemas.microsoft.com/office/mac/drawingml/2011/main" val="1"/>
+              <ma14:wrappingTextBoxFlag xmlns:ma14="http://schemas.microsoft.com/office/mac/drawingml/2011/main" xmlns:a14="http://schemas.microsoft.com/office/drawing/2010/main" xmlns:m="http://schemas.openxmlformats.org/officeDocument/2006/math" xmlns="" val="1"/>
             </a:ext>
           </a:extLst>
         </p:spPr>
@@ -12602,7 +12602,7 @@
           </a:effectLst>
           <a:extLst>
             <a:ext uri="{C572A759-6A51-4108-AA02-DFA0A04FC94B}">
-              <ma14:wrappingTextBoxFlag xmlns="" xmlns:m="http://schemas.openxmlformats.org/officeDocument/2006/math" xmlns:a14="http://schemas.microsoft.com/office/drawing/2010/main" xmlns:ma14="http://schemas.microsoft.com/office/mac/drawingml/2011/main" val="1"/>
+              <ma14:wrappingTextBoxFlag xmlns:ma14="http://schemas.microsoft.com/office/mac/drawingml/2011/main" xmlns:a14="http://schemas.microsoft.com/office/drawing/2010/main" xmlns:m="http://schemas.openxmlformats.org/officeDocument/2006/math" xmlns="" val="1"/>
             </a:ext>
           </a:extLst>
         </p:spPr>
@@ -12679,7 +12679,7 @@
           </a:ln>
           <a:extLst>
             <a:ext uri="{C572A759-6A51-4108-AA02-DFA0A04FC94B}">
-              <ma14:wrappingTextBoxFlag xmlns="" xmlns:m="http://schemas.openxmlformats.org/officeDocument/2006/math" xmlns:a14="http://schemas.microsoft.com/office/drawing/2010/main" xmlns:ma14="http://schemas.microsoft.com/office/mac/drawingml/2011/main" val="1"/>
+              <ma14:wrappingTextBoxFlag xmlns:ma14="http://schemas.microsoft.com/office/mac/drawingml/2011/main" xmlns:a14="http://schemas.microsoft.com/office/drawing/2010/main" xmlns:m="http://schemas.openxmlformats.org/officeDocument/2006/math" xmlns="" val="1"/>
             </a:ext>
           </a:extLst>
         </p:spPr>
@@ -12753,7 +12753,7 @@
           </a:ln>
           <a:extLst>
             <a:ext uri="{C572A759-6A51-4108-AA02-DFA0A04FC94B}">
-              <ma14:wrappingTextBoxFlag xmlns="" xmlns:m="http://schemas.openxmlformats.org/officeDocument/2006/math" xmlns:a14="http://schemas.microsoft.com/office/drawing/2010/main" xmlns:ma14="http://schemas.microsoft.com/office/mac/drawingml/2011/main" val="1"/>
+              <ma14:wrappingTextBoxFlag xmlns:ma14="http://schemas.microsoft.com/office/mac/drawingml/2011/main" xmlns:a14="http://schemas.microsoft.com/office/drawing/2010/main" xmlns:m="http://schemas.openxmlformats.org/officeDocument/2006/math" xmlns="" val="1"/>
             </a:ext>
           </a:extLst>
         </p:spPr>
@@ -12802,7 +12802,7 @@
           </a:prstGeom>
           <a:extLst>
             <a:ext uri="{C572A759-6A51-4108-AA02-DFA0A04FC94B}">
-              <ma14:wrappingTextBoxFlag xmlns="" xmlns:m="http://schemas.openxmlformats.org/officeDocument/2006/math" xmlns:a14="http://schemas.microsoft.com/office/drawing/2010/main" xmlns:ma14="http://schemas.microsoft.com/office/mac/drawingml/2011/main" val="1"/>
+              <ma14:wrappingTextBoxFlag xmlns:ma14="http://schemas.microsoft.com/office/mac/drawingml/2011/main" xmlns:a14="http://schemas.microsoft.com/office/drawing/2010/main" xmlns:m="http://schemas.openxmlformats.org/officeDocument/2006/math" xmlns="" val="1"/>
             </a:ext>
           </a:extLst>
         </p:spPr>
@@ -12872,7 +12872,7 @@
           </a:ln>
           <a:extLst>
             <a:ext uri="{C572A759-6A51-4108-AA02-DFA0A04FC94B}">
-              <ma14:wrappingTextBoxFlag xmlns="" xmlns:m="http://schemas.openxmlformats.org/officeDocument/2006/math" xmlns:a14="http://schemas.microsoft.com/office/drawing/2010/main" xmlns:ma14="http://schemas.microsoft.com/office/mac/drawingml/2011/main" val="1"/>
+              <ma14:wrappingTextBoxFlag xmlns:ma14="http://schemas.microsoft.com/office/mac/drawingml/2011/main" xmlns:a14="http://schemas.microsoft.com/office/drawing/2010/main" xmlns:m="http://schemas.openxmlformats.org/officeDocument/2006/math" xmlns="" val="1"/>
             </a:ext>
           </a:extLst>
         </p:spPr>
@@ -12907,7 +12907,7 @@
           </a:ln>
           <a:extLst>
             <a:ext uri="{C572A759-6A51-4108-AA02-DFA0A04FC94B}">
-              <ma14:wrappingTextBoxFlag xmlns="" xmlns:m="http://schemas.openxmlformats.org/officeDocument/2006/math" xmlns:a14="http://schemas.microsoft.com/office/drawing/2010/main" xmlns:ma14="http://schemas.microsoft.com/office/mac/drawingml/2011/main" val="1"/>
+              <ma14:wrappingTextBoxFlag xmlns:ma14="http://schemas.microsoft.com/office/mac/drawingml/2011/main" xmlns:a14="http://schemas.microsoft.com/office/drawing/2010/main" xmlns:m="http://schemas.openxmlformats.org/officeDocument/2006/math" xmlns="" val="1"/>
             </a:ext>
           </a:extLst>
         </p:spPr>
@@ -12996,7 +12996,7 @@
           </a:ln>
           <a:extLst>
             <a:ext uri="{C572A759-6A51-4108-AA02-DFA0A04FC94B}">
-              <ma14:wrappingTextBoxFlag xmlns="" xmlns:m="http://schemas.openxmlformats.org/officeDocument/2006/math" xmlns:a14="http://schemas.microsoft.com/office/drawing/2010/main" xmlns:ma14="http://schemas.microsoft.com/office/mac/drawingml/2011/main" val="1"/>
+              <ma14:wrappingTextBoxFlag xmlns:ma14="http://schemas.microsoft.com/office/mac/drawingml/2011/main" xmlns:a14="http://schemas.microsoft.com/office/drawing/2010/main" xmlns:m="http://schemas.openxmlformats.org/officeDocument/2006/math" xmlns="" val="1"/>
             </a:ext>
           </a:extLst>
         </p:spPr>
@@ -13033,7 +13033,7 @@
           </a:ln>
           <a:extLst>
             <a:ext uri="{C572A759-6A51-4108-AA02-DFA0A04FC94B}">
-              <ma14:wrappingTextBoxFlag xmlns="" xmlns:m="http://schemas.openxmlformats.org/officeDocument/2006/math" xmlns:a14="http://schemas.microsoft.com/office/drawing/2010/main" xmlns:ma14="http://schemas.microsoft.com/office/mac/drawingml/2011/main" val="1"/>
+              <ma14:wrappingTextBoxFlag xmlns:ma14="http://schemas.microsoft.com/office/mac/drawingml/2011/main" xmlns:a14="http://schemas.microsoft.com/office/drawing/2010/main" xmlns:m="http://schemas.openxmlformats.org/officeDocument/2006/math" xmlns="" val="1"/>
             </a:ext>
           </a:extLst>
         </p:spPr>
@@ -13125,7 +13125,7 @@
           </a:ln>
           <a:extLst>
             <a:ext uri="{C572A759-6A51-4108-AA02-DFA0A04FC94B}">
-              <ma14:wrappingTextBoxFlag xmlns="" xmlns:m="http://schemas.openxmlformats.org/officeDocument/2006/math" xmlns:a14="http://schemas.microsoft.com/office/drawing/2010/main" xmlns:ma14="http://schemas.microsoft.com/office/mac/drawingml/2011/main" val="1"/>
+              <ma14:wrappingTextBoxFlag xmlns:ma14="http://schemas.microsoft.com/office/mac/drawingml/2011/main" xmlns:a14="http://schemas.microsoft.com/office/drawing/2010/main" xmlns:m="http://schemas.openxmlformats.org/officeDocument/2006/math" xmlns="" val="1"/>
             </a:ext>
           </a:extLst>
         </p:spPr>
@@ -13199,7 +13199,7 @@
           </a:ln>
           <a:extLst>
             <a:ext uri="{C572A759-6A51-4108-AA02-DFA0A04FC94B}">
-              <ma14:wrappingTextBoxFlag xmlns="" xmlns:m="http://schemas.openxmlformats.org/officeDocument/2006/math" xmlns:a14="http://schemas.microsoft.com/office/drawing/2010/main" xmlns:ma14="http://schemas.microsoft.com/office/mac/drawingml/2011/main" val="1"/>
+              <ma14:wrappingTextBoxFlag xmlns:ma14="http://schemas.microsoft.com/office/mac/drawingml/2011/main" xmlns:a14="http://schemas.microsoft.com/office/drawing/2010/main" xmlns:m="http://schemas.openxmlformats.org/officeDocument/2006/math" xmlns="" val="1"/>
             </a:ext>
           </a:extLst>
         </p:spPr>
@@ -13283,7 +13283,7 @@
           </a:effectLst>
           <a:extLst>
             <a:ext uri="{C572A759-6A51-4108-AA02-DFA0A04FC94B}">
-              <ma14:wrappingTextBoxFlag xmlns="" xmlns:m="http://schemas.openxmlformats.org/officeDocument/2006/math" xmlns:a14="http://schemas.microsoft.com/office/drawing/2010/main" xmlns:ma14="http://schemas.microsoft.com/office/mac/drawingml/2011/main" val="1"/>
+              <ma14:wrappingTextBoxFlag xmlns:ma14="http://schemas.microsoft.com/office/mac/drawingml/2011/main" xmlns:a14="http://schemas.microsoft.com/office/drawing/2010/main" xmlns:m="http://schemas.openxmlformats.org/officeDocument/2006/math" xmlns="" val="1"/>
             </a:ext>
           </a:extLst>
         </p:spPr>
@@ -13360,7 +13360,7 @@
           </a:ln>
           <a:extLst>
             <a:ext uri="{C572A759-6A51-4108-AA02-DFA0A04FC94B}">
-              <ma14:wrappingTextBoxFlag xmlns="" xmlns:m="http://schemas.openxmlformats.org/officeDocument/2006/math" xmlns:a14="http://schemas.microsoft.com/office/drawing/2010/main" xmlns:ma14="http://schemas.microsoft.com/office/mac/drawingml/2011/main" val="1"/>
+              <ma14:wrappingTextBoxFlag xmlns:ma14="http://schemas.microsoft.com/office/mac/drawingml/2011/main" xmlns:a14="http://schemas.microsoft.com/office/drawing/2010/main" xmlns:m="http://schemas.openxmlformats.org/officeDocument/2006/math" xmlns="" val="1"/>
             </a:ext>
           </a:extLst>
         </p:spPr>
@@ -13403,7 +13403,7 @@
           </a:ln>
           <a:extLst>
             <a:ext uri="{C572A759-6A51-4108-AA02-DFA0A04FC94B}">
-              <ma14:wrappingTextBoxFlag xmlns="" xmlns:m="http://schemas.openxmlformats.org/officeDocument/2006/math" xmlns:a14="http://schemas.microsoft.com/office/drawing/2010/main" xmlns:ma14="http://schemas.microsoft.com/office/mac/drawingml/2011/main" val="1"/>
+              <ma14:wrappingTextBoxFlag xmlns:ma14="http://schemas.microsoft.com/office/mac/drawingml/2011/main" xmlns:a14="http://schemas.microsoft.com/office/drawing/2010/main" xmlns:m="http://schemas.openxmlformats.org/officeDocument/2006/math" xmlns="" val="1"/>
             </a:ext>
           </a:extLst>
         </p:spPr>
@@ -13452,7 +13452,7 @@
           </a:prstGeom>
           <a:extLst>
             <a:ext uri="{C572A759-6A51-4108-AA02-DFA0A04FC94B}">
-              <ma14:wrappingTextBoxFlag xmlns="" xmlns:m="http://schemas.openxmlformats.org/officeDocument/2006/math" xmlns:a14="http://schemas.microsoft.com/office/drawing/2010/main" xmlns:ma14="http://schemas.microsoft.com/office/mac/drawingml/2011/main" val="1"/>
+              <ma14:wrappingTextBoxFlag xmlns:ma14="http://schemas.microsoft.com/office/mac/drawingml/2011/main" xmlns:a14="http://schemas.microsoft.com/office/drawing/2010/main" xmlns:m="http://schemas.openxmlformats.org/officeDocument/2006/math" xmlns="" val="1"/>
             </a:ext>
           </a:extLst>
         </p:spPr>
@@ -13522,7 +13522,7 @@
           </a:ln>
           <a:extLst>
             <a:ext uri="{C572A759-6A51-4108-AA02-DFA0A04FC94B}">
-              <ma14:wrappingTextBoxFlag xmlns="" xmlns:m="http://schemas.openxmlformats.org/officeDocument/2006/math" xmlns:a14="http://schemas.microsoft.com/office/drawing/2010/main" xmlns:ma14="http://schemas.microsoft.com/office/mac/drawingml/2011/main" val="1"/>
+              <ma14:wrappingTextBoxFlag xmlns:ma14="http://schemas.microsoft.com/office/mac/drawingml/2011/main" xmlns:a14="http://schemas.microsoft.com/office/drawing/2010/main" xmlns:m="http://schemas.openxmlformats.org/officeDocument/2006/math" xmlns="" val="1"/>
             </a:ext>
           </a:extLst>
         </p:spPr>
@@ -13879,7 +13879,7 @@
           </a:ln>
           <a:extLst>
             <a:ext uri="{C572A759-6A51-4108-AA02-DFA0A04FC94B}">
-              <ma14:wrappingTextBoxFlag xmlns="" xmlns:m="http://schemas.openxmlformats.org/officeDocument/2006/math" xmlns:a14="http://schemas.microsoft.com/office/drawing/2010/main" xmlns:ma14="http://schemas.microsoft.com/office/mac/drawingml/2011/main" val="1"/>
+              <ma14:wrappingTextBoxFlag xmlns:ma14="http://schemas.microsoft.com/office/mac/drawingml/2011/main" xmlns:a14="http://schemas.microsoft.com/office/drawing/2010/main" xmlns:m="http://schemas.openxmlformats.org/officeDocument/2006/math" xmlns="" val="1"/>
             </a:ext>
           </a:extLst>
         </p:spPr>
@@ -13945,7 +13945,7 @@
           </a:ln>
           <a:extLst>
             <a:ext uri="{C572A759-6A51-4108-AA02-DFA0A04FC94B}">
-              <ma14:wrappingTextBoxFlag xmlns="" xmlns:m="http://schemas.openxmlformats.org/officeDocument/2006/math" xmlns:a14="http://schemas.microsoft.com/office/drawing/2010/main" xmlns:ma14="http://schemas.microsoft.com/office/mac/drawingml/2011/main" val="1"/>
+              <ma14:wrappingTextBoxFlag xmlns:ma14="http://schemas.microsoft.com/office/mac/drawingml/2011/main" xmlns:a14="http://schemas.microsoft.com/office/drawing/2010/main" xmlns:m="http://schemas.openxmlformats.org/officeDocument/2006/math" xmlns="" val="1"/>
             </a:ext>
           </a:extLst>
         </p:spPr>
@@ -14051,7 +14051,7 @@
           </a:ln>
           <a:extLst>
             <a:ext uri="{C572A759-6A51-4108-AA02-DFA0A04FC94B}">
-              <ma14:wrappingTextBoxFlag xmlns="" xmlns:m="http://schemas.openxmlformats.org/officeDocument/2006/math" xmlns:a14="http://schemas.microsoft.com/office/drawing/2010/main" xmlns:ma14="http://schemas.microsoft.com/office/mac/drawingml/2011/main" val="1"/>
+              <ma14:wrappingTextBoxFlag xmlns:ma14="http://schemas.microsoft.com/office/mac/drawingml/2011/main" xmlns:a14="http://schemas.microsoft.com/office/drawing/2010/main" xmlns:m="http://schemas.openxmlformats.org/officeDocument/2006/math" xmlns="" val="1"/>
             </a:ext>
           </a:extLst>
         </p:spPr>
@@ -14094,7 +14094,7 @@
           </a:ln>
           <a:extLst>
             <a:ext uri="{C572A759-6A51-4108-AA02-DFA0A04FC94B}">
-              <ma14:wrappingTextBoxFlag xmlns="" xmlns:m="http://schemas.openxmlformats.org/officeDocument/2006/math" xmlns:a14="http://schemas.microsoft.com/office/drawing/2010/main" xmlns:ma14="http://schemas.microsoft.com/office/mac/drawingml/2011/main" val="1"/>
+              <ma14:wrappingTextBoxFlag xmlns:ma14="http://schemas.microsoft.com/office/mac/drawingml/2011/main" xmlns:a14="http://schemas.microsoft.com/office/drawing/2010/main" xmlns:m="http://schemas.openxmlformats.org/officeDocument/2006/math" xmlns="" val="1"/>
             </a:ext>
           </a:extLst>
         </p:spPr>
@@ -14143,7 +14143,7 @@
           </a:prstGeom>
           <a:extLst>
             <a:ext uri="{C572A759-6A51-4108-AA02-DFA0A04FC94B}">
-              <ma14:wrappingTextBoxFlag xmlns="" xmlns:m="http://schemas.openxmlformats.org/officeDocument/2006/math" xmlns:a14="http://schemas.microsoft.com/office/drawing/2010/main" xmlns:ma14="http://schemas.microsoft.com/office/mac/drawingml/2011/main" val="1"/>
+              <ma14:wrappingTextBoxFlag xmlns:ma14="http://schemas.microsoft.com/office/mac/drawingml/2011/main" xmlns:a14="http://schemas.microsoft.com/office/drawing/2010/main" xmlns:m="http://schemas.openxmlformats.org/officeDocument/2006/math" xmlns="" val="1"/>
             </a:ext>
           </a:extLst>
         </p:spPr>
@@ -14213,7 +14213,7 @@
           </a:ln>
           <a:extLst>
             <a:ext uri="{C572A759-6A51-4108-AA02-DFA0A04FC94B}">
-              <ma14:wrappingTextBoxFlag xmlns="" xmlns:m="http://schemas.openxmlformats.org/officeDocument/2006/math" xmlns:a14="http://schemas.microsoft.com/office/drawing/2010/main" xmlns:ma14="http://schemas.microsoft.com/office/mac/drawingml/2011/main" val="1"/>
+              <ma14:wrappingTextBoxFlag xmlns:ma14="http://schemas.microsoft.com/office/mac/drawingml/2011/main" xmlns:a14="http://schemas.microsoft.com/office/drawing/2010/main" xmlns:m="http://schemas.openxmlformats.org/officeDocument/2006/math" xmlns="" val="1"/>
             </a:ext>
           </a:extLst>
         </p:spPr>
@@ -14570,7 +14570,7 @@
           </a:ln>
           <a:extLst>
             <a:ext uri="{C572A759-6A51-4108-AA02-DFA0A04FC94B}">
-              <ma14:wrappingTextBoxFlag xmlns="" xmlns:m="http://schemas.openxmlformats.org/officeDocument/2006/math" xmlns:a14="http://schemas.microsoft.com/office/drawing/2010/main" xmlns:ma14="http://schemas.microsoft.com/office/mac/drawingml/2011/main" val="1"/>
+              <ma14:wrappingTextBoxFlag xmlns:ma14="http://schemas.microsoft.com/office/mac/drawingml/2011/main" xmlns:a14="http://schemas.microsoft.com/office/drawing/2010/main" xmlns:m="http://schemas.openxmlformats.org/officeDocument/2006/math" xmlns="" val="1"/>
             </a:ext>
           </a:extLst>
         </p:spPr>
@@ -14636,7 +14636,7 @@
           </a:ln>
           <a:extLst>
             <a:ext uri="{C572A759-6A51-4108-AA02-DFA0A04FC94B}">
-              <ma14:wrappingTextBoxFlag xmlns="" xmlns:m="http://schemas.openxmlformats.org/officeDocument/2006/math" xmlns:a14="http://schemas.microsoft.com/office/drawing/2010/main" xmlns:ma14="http://schemas.microsoft.com/office/mac/drawingml/2011/main" val="1"/>
+              <ma14:wrappingTextBoxFlag xmlns:ma14="http://schemas.microsoft.com/office/mac/drawingml/2011/main" xmlns:a14="http://schemas.microsoft.com/office/drawing/2010/main" xmlns:m="http://schemas.openxmlformats.org/officeDocument/2006/math" xmlns="" val="1"/>
             </a:ext>
           </a:extLst>
         </p:spPr>
@@ -14685,7 +14685,7 @@
           </a:effectLst>
           <a:extLst>
             <a:ext uri="{C572A759-6A51-4108-AA02-DFA0A04FC94B}">
-              <ma14:wrappingTextBoxFlag xmlns="" xmlns:m="http://schemas.openxmlformats.org/officeDocument/2006/math" xmlns:a14="http://schemas.microsoft.com/office/drawing/2010/main" xmlns:ma14="http://schemas.microsoft.com/office/mac/drawingml/2011/main" val="1"/>
+              <ma14:wrappingTextBoxFlag xmlns:ma14="http://schemas.microsoft.com/office/mac/drawingml/2011/main" xmlns:a14="http://schemas.microsoft.com/office/drawing/2010/main" xmlns:m="http://schemas.openxmlformats.org/officeDocument/2006/math" xmlns="" val="1"/>
             </a:ext>
           </a:extLst>
         </p:spPr>
@@ -14753,7 +14753,7 @@
           </a:ln>
           <a:extLst>
             <a:ext uri="{C572A759-6A51-4108-AA02-DFA0A04FC94B}">
-              <ma14:wrappingTextBoxFlag xmlns="" xmlns:m="http://schemas.openxmlformats.org/officeDocument/2006/math" xmlns:a14="http://schemas.microsoft.com/office/drawing/2010/main" xmlns:ma14="http://schemas.microsoft.com/office/mac/drawingml/2011/main" val="1"/>
+              <ma14:wrappingTextBoxFlag xmlns:ma14="http://schemas.microsoft.com/office/mac/drawingml/2011/main" xmlns:a14="http://schemas.microsoft.com/office/drawing/2010/main" xmlns:m="http://schemas.openxmlformats.org/officeDocument/2006/math" xmlns="" val="1"/>
             </a:ext>
           </a:extLst>
         </p:spPr>
@@ -14796,7 +14796,7 @@
           </a:ln>
           <a:extLst>
             <a:ext uri="{C572A759-6A51-4108-AA02-DFA0A04FC94B}">
-              <ma14:wrappingTextBoxFlag xmlns="" xmlns:m="http://schemas.openxmlformats.org/officeDocument/2006/math" xmlns:a14="http://schemas.microsoft.com/office/drawing/2010/main" xmlns:ma14="http://schemas.microsoft.com/office/mac/drawingml/2011/main" val="1"/>
+              <ma14:wrappingTextBoxFlag xmlns:ma14="http://schemas.microsoft.com/office/mac/drawingml/2011/main" xmlns:a14="http://schemas.microsoft.com/office/drawing/2010/main" xmlns:m="http://schemas.openxmlformats.org/officeDocument/2006/math" xmlns="" val="1"/>
             </a:ext>
           </a:extLst>
         </p:spPr>
@@ -14845,7 +14845,7 @@
           </a:prstGeom>
           <a:extLst>
             <a:ext uri="{C572A759-6A51-4108-AA02-DFA0A04FC94B}">
-              <ma14:wrappingTextBoxFlag xmlns="" xmlns:m="http://schemas.openxmlformats.org/officeDocument/2006/math" xmlns:a14="http://schemas.microsoft.com/office/drawing/2010/main" xmlns:ma14="http://schemas.microsoft.com/office/mac/drawingml/2011/main" val="1"/>
+              <ma14:wrappingTextBoxFlag xmlns:ma14="http://schemas.microsoft.com/office/mac/drawingml/2011/main" xmlns:a14="http://schemas.microsoft.com/office/drawing/2010/main" xmlns:m="http://schemas.openxmlformats.org/officeDocument/2006/math" xmlns="" val="1"/>
             </a:ext>
           </a:extLst>
         </p:spPr>
@@ -14973,7 +14973,7 @@
           </a:ln>
           <a:extLst>
             <a:ext uri="{C572A759-6A51-4108-AA02-DFA0A04FC94B}">
-              <ma14:wrappingTextBoxFlag xmlns="" xmlns:m="http://schemas.openxmlformats.org/officeDocument/2006/math" xmlns:a14="http://schemas.microsoft.com/office/drawing/2010/main" xmlns:ma14="http://schemas.microsoft.com/office/mac/drawingml/2011/main" val="1"/>
+              <ma14:wrappingTextBoxFlag xmlns:ma14="http://schemas.microsoft.com/office/mac/drawingml/2011/main" xmlns:a14="http://schemas.microsoft.com/office/drawing/2010/main" xmlns:m="http://schemas.openxmlformats.org/officeDocument/2006/math" xmlns="" val="1"/>
             </a:ext>
           </a:extLst>
         </p:spPr>
@@ -15008,7 +15008,7 @@
           </a:ln>
           <a:extLst>
             <a:ext uri="{C572A759-6A51-4108-AA02-DFA0A04FC94B}">
-              <ma14:wrappingTextBoxFlag xmlns="" xmlns:m="http://schemas.openxmlformats.org/officeDocument/2006/math" xmlns:a14="http://schemas.microsoft.com/office/drawing/2010/main" xmlns:ma14="http://schemas.microsoft.com/office/mac/drawingml/2011/main" val="1"/>
+              <ma14:wrappingTextBoxFlag xmlns:ma14="http://schemas.microsoft.com/office/mac/drawingml/2011/main" xmlns:a14="http://schemas.microsoft.com/office/drawing/2010/main" xmlns:m="http://schemas.openxmlformats.org/officeDocument/2006/math" xmlns="" val="1"/>
             </a:ext>
           </a:extLst>
         </p:spPr>
@@ -15043,7 +15043,7 @@
           </a:ln>
           <a:extLst>
             <a:ext uri="{C572A759-6A51-4108-AA02-DFA0A04FC94B}">
-              <ma14:wrappingTextBoxFlag xmlns="" xmlns:m="http://schemas.openxmlformats.org/officeDocument/2006/math" xmlns:a14="http://schemas.microsoft.com/office/drawing/2010/main" xmlns:ma14="http://schemas.microsoft.com/office/mac/drawingml/2011/main" val="1"/>
+              <ma14:wrappingTextBoxFlag xmlns:ma14="http://schemas.microsoft.com/office/mac/drawingml/2011/main" xmlns:a14="http://schemas.microsoft.com/office/drawing/2010/main" xmlns:m="http://schemas.openxmlformats.org/officeDocument/2006/math" xmlns="" val="1"/>
             </a:ext>
           </a:extLst>
         </p:spPr>
@@ -15078,7 +15078,7 @@
           </a:ln>
           <a:extLst>
             <a:ext uri="{C572A759-6A51-4108-AA02-DFA0A04FC94B}">
-              <ma14:wrappingTextBoxFlag xmlns="" xmlns:m="http://schemas.openxmlformats.org/officeDocument/2006/math" xmlns:a14="http://schemas.microsoft.com/office/drawing/2010/main" xmlns:ma14="http://schemas.microsoft.com/office/mac/drawingml/2011/main" val="1"/>
+              <ma14:wrappingTextBoxFlag xmlns:ma14="http://schemas.microsoft.com/office/mac/drawingml/2011/main" xmlns:a14="http://schemas.microsoft.com/office/drawing/2010/main" xmlns:m="http://schemas.openxmlformats.org/officeDocument/2006/math" xmlns="" val="1"/>
             </a:ext>
           </a:extLst>
         </p:spPr>
@@ -15113,7 +15113,7 @@
           </a:ln>
           <a:extLst>
             <a:ext uri="{C572A759-6A51-4108-AA02-DFA0A04FC94B}">
-              <ma14:wrappingTextBoxFlag xmlns="" xmlns:m="http://schemas.openxmlformats.org/officeDocument/2006/math" xmlns:a14="http://schemas.microsoft.com/office/drawing/2010/main" xmlns:ma14="http://schemas.microsoft.com/office/mac/drawingml/2011/main" val="1"/>
+              <ma14:wrappingTextBoxFlag xmlns:ma14="http://schemas.microsoft.com/office/mac/drawingml/2011/main" xmlns:a14="http://schemas.microsoft.com/office/drawing/2010/main" xmlns:m="http://schemas.openxmlformats.org/officeDocument/2006/math" xmlns="" val="1"/>
             </a:ext>
           </a:extLst>
         </p:spPr>
@@ -15148,7 +15148,7 @@
           </a:ln>
           <a:extLst>
             <a:ext uri="{C572A759-6A51-4108-AA02-DFA0A04FC94B}">
-              <ma14:wrappingTextBoxFlag xmlns="" xmlns:m="http://schemas.openxmlformats.org/officeDocument/2006/math" xmlns:a14="http://schemas.microsoft.com/office/drawing/2010/main" xmlns:ma14="http://schemas.microsoft.com/office/mac/drawingml/2011/main" val="1"/>
+              <ma14:wrappingTextBoxFlag xmlns:ma14="http://schemas.microsoft.com/office/mac/drawingml/2011/main" xmlns:a14="http://schemas.microsoft.com/office/drawing/2010/main" xmlns:m="http://schemas.openxmlformats.org/officeDocument/2006/math" xmlns="" val="1"/>
             </a:ext>
           </a:extLst>
         </p:spPr>
@@ -15183,7 +15183,7 @@
           </a:ln>
           <a:extLst>
             <a:ext uri="{C572A759-6A51-4108-AA02-DFA0A04FC94B}">
-              <ma14:wrappingTextBoxFlag xmlns="" xmlns:m="http://schemas.openxmlformats.org/officeDocument/2006/math" xmlns:a14="http://schemas.microsoft.com/office/drawing/2010/main" xmlns:ma14="http://schemas.microsoft.com/office/mac/drawingml/2011/main" val="1"/>
+              <ma14:wrappingTextBoxFlag xmlns:ma14="http://schemas.microsoft.com/office/mac/drawingml/2011/main" xmlns:a14="http://schemas.microsoft.com/office/drawing/2010/main" xmlns:m="http://schemas.openxmlformats.org/officeDocument/2006/math" xmlns="" val="1"/>
             </a:ext>
           </a:extLst>
         </p:spPr>
@@ -15218,7 +15218,7 @@
           </a:ln>
           <a:extLst>
             <a:ext uri="{C572A759-6A51-4108-AA02-DFA0A04FC94B}">
-              <ma14:wrappingTextBoxFlag xmlns="" xmlns:m="http://schemas.openxmlformats.org/officeDocument/2006/math" xmlns:a14="http://schemas.microsoft.com/office/drawing/2010/main" xmlns:ma14="http://schemas.microsoft.com/office/mac/drawingml/2011/main" val="1"/>
+              <ma14:wrappingTextBoxFlag xmlns:ma14="http://schemas.microsoft.com/office/mac/drawingml/2011/main" xmlns:a14="http://schemas.microsoft.com/office/drawing/2010/main" xmlns:m="http://schemas.openxmlformats.org/officeDocument/2006/math" xmlns="" val="1"/>
             </a:ext>
           </a:extLst>
         </p:spPr>
@@ -15329,7 +15329,7 @@
           </a:ln>
           <a:extLst>
             <a:ext uri="{C572A759-6A51-4108-AA02-DFA0A04FC94B}">
-              <ma14:wrappingTextBoxFlag xmlns="" xmlns:m="http://schemas.openxmlformats.org/officeDocument/2006/math" xmlns:a14="http://schemas.microsoft.com/office/drawing/2010/main" xmlns:ma14="http://schemas.microsoft.com/office/mac/drawingml/2011/main" val="1"/>
+              <ma14:wrappingTextBoxFlag xmlns:ma14="http://schemas.microsoft.com/office/mac/drawingml/2011/main" xmlns:a14="http://schemas.microsoft.com/office/drawing/2010/main" xmlns:m="http://schemas.openxmlformats.org/officeDocument/2006/math" xmlns="" val="1"/>
             </a:ext>
           </a:extLst>
         </p:spPr>
@@ -15372,7 +15372,7 @@
           </a:ln>
           <a:extLst>
             <a:ext uri="{C572A759-6A51-4108-AA02-DFA0A04FC94B}">
-              <ma14:wrappingTextBoxFlag xmlns="" xmlns:m="http://schemas.openxmlformats.org/officeDocument/2006/math" xmlns:a14="http://schemas.microsoft.com/office/drawing/2010/main" xmlns:ma14="http://schemas.microsoft.com/office/mac/drawingml/2011/main" val="1"/>
+              <ma14:wrappingTextBoxFlag xmlns:ma14="http://schemas.microsoft.com/office/mac/drawingml/2011/main" xmlns:a14="http://schemas.microsoft.com/office/drawing/2010/main" xmlns:m="http://schemas.openxmlformats.org/officeDocument/2006/math" xmlns="" val="1"/>
             </a:ext>
           </a:extLst>
         </p:spPr>
@@ -15421,7 +15421,7 @@
           </a:prstGeom>
           <a:extLst>
             <a:ext uri="{C572A759-6A51-4108-AA02-DFA0A04FC94B}">
-              <ma14:wrappingTextBoxFlag xmlns="" xmlns:m="http://schemas.openxmlformats.org/officeDocument/2006/math" xmlns:a14="http://schemas.microsoft.com/office/drawing/2010/main" xmlns:ma14="http://schemas.microsoft.com/office/mac/drawingml/2011/main" val="1"/>
+              <ma14:wrappingTextBoxFlag xmlns:ma14="http://schemas.microsoft.com/office/mac/drawingml/2011/main" xmlns:a14="http://schemas.microsoft.com/office/drawing/2010/main" xmlns:m="http://schemas.openxmlformats.org/officeDocument/2006/math" xmlns="" val="1"/>
             </a:ext>
           </a:extLst>
         </p:spPr>
@@ -15550,7 +15550,7 @@
           </a:ln>
           <a:extLst>
             <a:ext uri="{C572A759-6A51-4108-AA02-DFA0A04FC94B}">
-              <ma14:wrappingTextBoxFlag xmlns="" xmlns:m="http://schemas.openxmlformats.org/officeDocument/2006/math" xmlns:a14="http://schemas.microsoft.com/office/drawing/2010/main" xmlns:ma14="http://schemas.microsoft.com/office/mac/drawingml/2011/main" val="1"/>
+              <ma14:wrappingTextBoxFlag xmlns:ma14="http://schemas.microsoft.com/office/mac/drawingml/2011/main" xmlns:a14="http://schemas.microsoft.com/office/drawing/2010/main" xmlns:m="http://schemas.openxmlformats.org/officeDocument/2006/math" xmlns="" val="1"/>
             </a:ext>
           </a:extLst>
         </p:spPr>
@@ -15586,7 +15586,7 @@
           </a:ln>
           <a:extLst>
             <a:ext uri="{C572A759-6A51-4108-AA02-DFA0A04FC94B}">
-              <ma14:wrappingTextBoxFlag xmlns="" xmlns:m="http://schemas.openxmlformats.org/officeDocument/2006/math" xmlns:a14="http://schemas.microsoft.com/office/drawing/2010/main" xmlns:ma14="http://schemas.microsoft.com/office/mac/drawingml/2011/main" val="1"/>
+              <ma14:wrappingTextBoxFlag xmlns:ma14="http://schemas.microsoft.com/office/mac/drawingml/2011/main" xmlns:a14="http://schemas.microsoft.com/office/drawing/2010/main" xmlns:m="http://schemas.openxmlformats.org/officeDocument/2006/math" xmlns="" val="1"/>
             </a:ext>
           </a:extLst>
         </p:spPr>
@@ -15706,7 +15706,7 @@
           </a:ln>
           <a:extLst>
             <a:ext uri="{C572A759-6A51-4108-AA02-DFA0A04FC94B}">
-              <ma14:wrappingTextBoxFlag xmlns="" xmlns:m="http://schemas.openxmlformats.org/officeDocument/2006/math" xmlns:a14="http://schemas.microsoft.com/office/drawing/2010/main" xmlns:ma14="http://schemas.microsoft.com/office/mac/drawingml/2011/main" val="1"/>
+              <ma14:wrappingTextBoxFlag xmlns:ma14="http://schemas.microsoft.com/office/mac/drawingml/2011/main" xmlns:a14="http://schemas.microsoft.com/office/drawing/2010/main" xmlns:m="http://schemas.openxmlformats.org/officeDocument/2006/math" xmlns="" val="1"/>
             </a:ext>
           </a:extLst>
         </p:spPr>
@@ -15741,7 +15741,7 @@
           </a:ln>
           <a:extLst>
             <a:ext uri="{C572A759-6A51-4108-AA02-DFA0A04FC94B}">
-              <ma14:wrappingTextBoxFlag xmlns="" xmlns:m="http://schemas.openxmlformats.org/officeDocument/2006/math" xmlns:a14="http://schemas.microsoft.com/office/drawing/2010/main" xmlns:ma14="http://schemas.microsoft.com/office/mac/drawingml/2011/main" val="1"/>
+              <ma14:wrappingTextBoxFlag xmlns:ma14="http://schemas.microsoft.com/office/mac/drawingml/2011/main" xmlns:a14="http://schemas.microsoft.com/office/drawing/2010/main" xmlns:m="http://schemas.openxmlformats.org/officeDocument/2006/math" xmlns="" val="1"/>
             </a:ext>
           </a:extLst>
         </p:spPr>
@@ -15813,7 +15813,7 @@
           </a:ln>
           <a:extLst>
             <a:ext uri="{C572A759-6A51-4108-AA02-DFA0A04FC94B}">
-              <ma14:wrappingTextBoxFlag xmlns="" xmlns:m="http://schemas.openxmlformats.org/officeDocument/2006/math" xmlns:a14="http://schemas.microsoft.com/office/drawing/2010/main" xmlns:ma14="http://schemas.microsoft.com/office/mac/drawingml/2011/main" val="1"/>
+              <ma14:wrappingTextBoxFlag xmlns:ma14="http://schemas.microsoft.com/office/mac/drawingml/2011/main" xmlns:a14="http://schemas.microsoft.com/office/drawing/2010/main" xmlns:m="http://schemas.openxmlformats.org/officeDocument/2006/math" xmlns="" val="1"/>
             </a:ext>
           </a:extLst>
         </p:spPr>
@@ -15865,7 +15865,7 @@
           </a:ln>
           <a:extLst>
             <a:ext uri="{C572A759-6A51-4108-AA02-DFA0A04FC94B}">
-              <ma14:wrappingTextBoxFlag xmlns="" xmlns:m="http://schemas.openxmlformats.org/officeDocument/2006/math" xmlns:a14="http://schemas.microsoft.com/office/drawing/2010/main" xmlns:ma14="http://schemas.microsoft.com/office/mac/drawingml/2011/main" val="1"/>
+              <ma14:wrappingTextBoxFlag xmlns:ma14="http://schemas.microsoft.com/office/mac/drawingml/2011/main" xmlns:a14="http://schemas.microsoft.com/office/drawing/2010/main" xmlns:m="http://schemas.openxmlformats.org/officeDocument/2006/math" xmlns="" val="1"/>
             </a:ext>
           </a:extLst>
         </p:spPr>
@@ -15939,7 +15939,7 @@
           </a:ln>
           <a:extLst>
             <a:ext uri="{C572A759-6A51-4108-AA02-DFA0A04FC94B}">
-              <ma14:wrappingTextBoxFlag xmlns="" xmlns:m="http://schemas.openxmlformats.org/officeDocument/2006/math" xmlns:a14="http://schemas.microsoft.com/office/drawing/2010/main" xmlns:ma14="http://schemas.microsoft.com/office/mac/drawingml/2011/main" val="1"/>
+              <ma14:wrappingTextBoxFlag xmlns:ma14="http://schemas.microsoft.com/office/mac/drawingml/2011/main" xmlns:a14="http://schemas.microsoft.com/office/drawing/2010/main" xmlns:m="http://schemas.openxmlformats.org/officeDocument/2006/math" xmlns="" val="1"/>
             </a:ext>
           </a:extLst>
         </p:spPr>
@@ -19520,7 +19520,7 @@
           <a:p>
             <a:r>
               <a:rPr lang="de-DE" dirty="0"/>
-              <a:t>Reference:</a:t>
+              <a:t>References:</a:t>
             </a:r>
           </a:p>
         </p:txBody>
@@ -19742,35 +19742,17 @@
           </a:p>
           <a:p>
             <a:r>
-              <a:rPr lang="en-US" sz="900" dirty="0">
+              <a:rPr lang="de-DE" sz="900" dirty="0">
                 <a:hlinkClick r:id="rId12"/>
               </a:rPr>
-              <a:t>https://pathmind.com/wiki/generative-adversarial-network-gan</a:t>
-            </a:r>
-            <a:endParaRPr lang="en-US" sz="900" dirty="0"/>
-          </a:p>
-          <a:p>
-            <a:r>
-              <a:rPr lang="en-US" sz="900" dirty="0">
+              <a:t>https://brilliant.org/wiki/convolutional-neural-network</a:t>
+            </a:r>
+            <a:endParaRPr lang="de-DE" sz="900" dirty="0"/>
+          </a:p>
+          <a:p>
+            <a:r>
+              <a:rPr lang="de-DE" sz="900" dirty="0">
                 <a:hlinkClick r:id="rId13"/>
-              </a:rPr>
-              <a:t>https://towardsdatascience.com/applied-deep-learning-part-3-autoencoders-1c083af4d798</a:t>
-            </a:r>
-            <a:endParaRPr lang="en-US" sz="900" dirty="0"/>
-          </a:p>
-          <a:p>
-            <a:r>
-              <a:rPr lang="de-DE" sz="900" dirty="0">
-                <a:hlinkClick r:id="rId14"/>
-              </a:rPr>
-              <a:t>https://brilliant.org/wiki/convolutional-neural-network</a:t>
-            </a:r>
-            <a:endParaRPr lang="de-DE" sz="900" dirty="0"/>
-          </a:p>
-          <a:p>
-            <a:r>
-              <a:rPr lang="de-DE" sz="900" dirty="0">
-                <a:hlinkClick r:id="rId15"/>
               </a:rPr>
               <a:t>https://www.kaggle.com/gauravsharma99/facial-emotion-recognition</a:t>
             </a:r>

</xml_diff>